<commit_message>
Fixed display of selection, scrolling, zooming etc. by introducing coordinate systems for text, document and view
</commit_message>
<xml_diff>
--- a/PdfParser Design.pptx
+++ b/PdfParser Design.pptx
@@ -5,7 +5,7 @@
     <p:sldMasterId id="2147483648" r:id="rId1"/>
   </p:sldMasterIdLst>
   <p:notesMasterIdLst>
-    <p:notesMasterId r:id="rId17"/>
+    <p:notesMasterId r:id="rId18"/>
   </p:notesMasterIdLst>
   <p:sldIdLst>
     <p:sldId id="263" r:id="rId2"/>
@@ -23,6 +23,7 @@
     <p:sldId id="262" r:id="rId14"/>
     <p:sldId id="264" r:id="rId15"/>
     <p:sldId id="265" r:id="rId16"/>
+    <p:sldId id="272" r:id="rId17"/>
   </p:sldIdLst>
   <p:sldSz cx="9144000" cy="6858000" type="screen4x3"/>
   <p:notesSz cx="6858000" cy="9144000"/>
@@ -206,7 +207,7 @@
           <a:p>
             <a:fld id="{D9868407-9A4F-47AB-A8EB-DC5757C925AB}" type="datetimeFigureOut">
               <a:rPr lang="en-SG" smtClean="0"/>
-              <a:t>30/8/2021</a:t>
+              <a:t>11/9/2021</a:t>
             </a:fld>
             <a:endParaRPr lang="en-SG"/>
           </a:p>
@@ -739,7 +740,7 @@
           <a:p>
             <a:fld id="{8ED238AC-D00D-4077-9A18-165FEE5E386A}" type="datetimeFigureOut">
               <a:rPr lang="en-SG" smtClean="0"/>
-              <a:t>28/8/2021</a:t>
+              <a:t>11/9/2021</a:t>
             </a:fld>
             <a:endParaRPr lang="en-SG"/>
           </a:p>
@@ -909,7 +910,7 @@
           <a:p>
             <a:fld id="{8ED238AC-D00D-4077-9A18-165FEE5E386A}" type="datetimeFigureOut">
               <a:rPr lang="en-SG" smtClean="0"/>
-              <a:t>28/8/2021</a:t>
+              <a:t>11/9/2021</a:t>
             </a:fld>
             <a:endParaRPr lang="en-SG"/>
           </a:p>
@@ -1089,7 +1090,7 @@
           <a:p>
             <a:fld id="{8ED238AC-D00D-4077-9A18-165FEE5E386A}" type="datetimeFigureOut">
               <a:rPr lang="en-SG" smtClean="0"/>
-              <a:t>28/8/2021</a:t>
+              <a:t>11/9/2021</a:t>
             </a:fld>
             <a:endParaRPr lang="en-SG"/>
           </a:p>
@@ -1259,7 +1260,7 @@
           <a:p>
             <a:fld id="{8ED238AC-D00D-4077-9A18-165FEE5E386A}" type="datetimeFigureOut">
               <a:rPr lang="en-SG" smtClean="0"/>
-              <a:t>28/8/2021</a:t>
+              <a:t>11/9/2021</a:t>
             </a:fld>
             <a:endParaRPr lang="en-SG"/>
           </a:p>
@@ -1505,7 +1506,7 @@
           <a:p>
             <a:fld id="{8ED238AC-D00D-4077-9A18-165FEE5E386A}" type="datetimeFigureOut">
               <a:rPr lang="en-SG" smtClean="0"/>
-              <a:t>28/8/2021</a:t>
+              <a:t>11/9/2021</a:t>
             </a:fld>
             <a:endParaRPr lang="en-SG"/>
           </a:p>
@@ -1793,7 +1794,7 @@
           <a:p>
             <a:fld id="{8ED238AC-D00D-4077-9A18-165FEE5E386A}" type="datetimeFigureOut">
               <a:rPr lang="en-SG" smtClean="0"/>
-              <a:t>28/8/2021</a:t>
+              <a:t>11/9/2021</a:t>
             </a:fld>
             <a:endParaRPr lang="en-SG"/>
           </a:p>
@@ -2215,7 +2216,7 @@
           <a:p>
             <a:fld id="{8ED238AC-D00D-4077-9A18-165FEE5E386A}" type="datetimeFigureOut">
               <a:rPr lang="en-SG" smtClean="0"/>
-              <a:t>28/8/2021</a:t>
+              <a:t>11/9/2021</a:t>
             </a:fld>
             <a:endParaRPr lang="en-SG"/>
           </a:p>
@@ -2333,7 +2334,7 @@
           <a:p>
             <a:fld id="{8ED238AC-D00D-4077-9A18-165FEE5E386A}" type="datetimeFigureOut">
               <a:rPr lang="en-SG" smtClean="0"/>
-              <a:t>28/8/2021</a:t>
+              <a:t>11/9/2021</a:t>
             </a:fld>
             <a:endParaRPr lang="en-SG"/>
           </a:p>
@@ -2428,7 +2429,7 @@
           <a:p>
             <a:fld id="{8ED238AC-D00D-4077-9A18-165FEE5E386A}" type="datetimeFigureOut">
               <a:rPr lang="en-SG" smtClean="0"/>
-              <a:t>28/8/2021</a:t>
+              <a:t>11/9/2021</a:t>
             </a:fld>
             <a:endParaRPr lang="en-SG"/>
           </a:p>
@@ -2705,7 +2706,7 @@
           <a:p>
             <a:fld id="{8ED238AC-D00D-4077-9A18-165FEE5E386A}" type="datetimeFigureOut">
               <a:rPr lang="en-SG" smtClean="0"/>
-              <a:t>28/8/2021</a:t>
+              <a:t>11/9/2021</a:t>
             </a:fld>
             <a:endParaRPr lang="en-SG"/>
           </a:p>
@@ -2958,7 +2959,7 @@
           <a:p>
             <a:fld id="{8ED238AC-D00D-4077-9A18-165FEE5E386A}" type="datetimeFigureOut">
               <a:rPr lang="en-SG" smtClean="0"/>
-              <a:t>28/8/2021</a:t>
+              <a:t>11/9/2021</a:t>
             </a:fld>
             <a:endParaRPr lang="en-SG"/>
           </a:p>
@@ -3171,7 +3172,7 @@
           <a:p>
             <a:fld id="{8ED238AC-D00D-4077-9A18-165FEE5E386A}" type="datetimeFigureOut">
               <a:rPr lang="en-SG" smtClean="0"/>
-              <a:t>28/8/2021</a:t>
+              <a:t>11/9/2021</a:t>
             </a:fld>
             <a:endParaRPr lang="en-SG"/>
           </a:p>
@@ -3618,13 +3619,8 @@
           <a:p>
             <a:r>
               <a:rPr lang="en-SG" sz="1200" dirty="0" smtClean="0"/>
-              <a:t>     %</a:t>
-            </a:r>
-            <a:r>
-              <a:rPr lang="en-SG" sz="1200" dirty="0" smtClean="0"/>
-              <a:t>PDF-1.0</a:t>
-            </a:r>
-            <a:endParaRPr lang="en-SG" sz="1200" dirty="0" smtClean="0"/>
+              <a:t>     %PDF-1.0</a:t>
+            </a:r>
           </a:p>
           <a:p>
             <a:r>
@@ -3779,11 +3775,7 @@
             </a:r>
             <a:r>
               <a:rPr lang="en-SG" sz="1200" dirty="0" smtClean="0"/>
-              <a:t> </a:t>
-            </a:r>
-            <a:r>
-              <a:rPr lang="en-SG" sz="1200" dirty="0" smtClean="0"/>
-              <a:t>12345</a:t>
+              <a:t> 12345</a:t>
             </a:r>
           </a:p>
           <a:p>
@@ -4260,7 +4252,6 @@
               <a:rPr lang="en-SG" sz="1200" dirty="0"/>
               <a:t>j</a:t>
             </a:r>
-            <a:endParaRPr lang="en-SG" sz="1200" dirty="0"/>
           </a:p>
         </p:txBody>
       </p:sp>
@@ -4409,11 +4400,7 @@
           <a:p>
             <a:r>
               <a:rPr lang="pt-BR" sz="1200" dirty="0" smtClean="0"/>
-              <a:t>/</a:t>
-            </a:r>
-            <a:r>
-              <a:rPr lang="pt-BR" sz="1200" dirty="0" smtClean="0"/>
-              <a:t>Type/Catalog</a:t>
+              <a:t>/Type/Catalog</a:t>
             </a:r>
           </a:p>
           <a:p>
@@ -12754,6 +12741,13 @@
   <p:clrMapOvr>
     <a:masterClrMapping/>
   </p:clrMapOvr>
+  <p:timing>
+    <p:tnLst>
+      <p:par>
+        <p:cTn id="1" dur="indefinite" restart="never" nodeType="tmRoot"/>
+      </p:par>
+    </p:tnLst>
+  </p:timing>
 </p:sld>
 </file>
 
@@ -14205,6 +14199,13 @@
   <p:clrMapOvr>
     <a:masterClrMapping/>
   </p:clrMapOvr>
+  <p:timing>
+    <p:tnLst>
+      <p:par>
+        <p:cTn id="1" dur="indefinite" restart="never" nodeType="tmRoot"/>
+      </p:par>
+    </p:tnLst>
+  </p:timing>
 </p:sld>
 </file>
 
@@ -14792,6 +14793,870 @@
   <p:clrMapOvr>
     <a:masterClrMapping/>
   </p:clrMapOvr>
+  <p:timing>
+    <p:tnLst>
+      <p:par>
+        <p:cTn id="1" dur="indefinite" restart="never" nodeType="tmRoot"/>
+      </p:par>
+    </p:tnLst>
+  </p:timing>
+</p:sld>
+</file>
+
+<file path=ppt/slides/slide16.xml><?xml version="1.0" encoding="utf-8"?>
+<p:sld xmlns:a="http://schemas.openxmlformats.org/drawingml/2006/main" xmlns:r="http://schemas.openxmlformats.org/officeDocument/2006/relationships" xmlns:p="http://schemas.openxmlformats.org/presentationml/2006/main">
+  <p:cSld>
+    <p:spTree>
+      <p:nvGrpSpPr>
+        <p:cNvPr id="1" name=""/>
+        <p:cNvGrpSpPr/>
+        <p:nvPr/>
+      </p:nvGrpSpPr>
+      <p:grpSpPr>
+        <a:xfrm>
+          <a:off x="0" y="0"/>
+          <a:ext cx="0" cy="0"/>
+          <a:chOff x="0" y="0"/>
+          <a:chExt cx="0" cy="0"/>
+        </a:xfrm>
+      </p:grpSpPr>
+      <p:sp>
+        <p:nvSpPr>
+          <p:cNvPr id="4" name="Rectangle 3"/>
+          <p:cNvSpPr/>
+          <p:nvPr/>
+        </p:nvSpPr>
+        <p:spPr>
+          <a:xfrm>
+            <a:off x="107504" y="44624"/>
+            <a:ext cx="7704856" cy="369332"/>
+          </a:xfrm>
+          <a:prstGeom prst="rect">
+            <a:avLst/>
+          </a:prstGeom>
+        </p:spPr>
+        <p:txBody>
+          <a:bodyPr wrap="square">
+            <a:spAutoFit/>
+          </a:bodyPr>
+          <a:lstStyle/>
+          <a:p>
+            <a:r>
+              <a:rPr lang="en-SG" b="1" dirty="0" smtClean="0"/>
+              <a:t>Coordinates</a:t>
+            </a:r>
+            <a:endParaRPr lang="en-SG" b="1" dirty="0"/>
+          </a:p>
+        </p:txBody>
+      </p:sp>
+      <p:sp>
+        <p:nvSpPr>
+          <p:cNvPr id="5" name="Rectangle 4"/>
+          <p:cNvSpPr/>
+          <p:nvPr/>
+        </p:nvSpPr>
+        <p:spPr>
+          <a:xfrm>
+            <a:off x="1859173" y="434876"/>
+            <a:ext cx="3096344" cy="3930228"/>
+          </a:xfrm>
+          <a:prstGeom prst="rect">
+            <a:avLst/>
+          </a:prstGeom>
+          <a:ln>
+            <a:headEnd type="none" w="med" len="med"/>
+            <a:tailEnd type="arrow" w="med" len="med"/>
+          </a:ln>
+        </p:spPr>
+        <p:style>
+          <a:lnRef idx="1">
+            <a:schemeClr val="dk1"/>
+          </a:lnRef>
+          <a:fillRef idx="2">
+            <a:schemeClr val="dk1"/>
+          </a:fillRef>
+          <a:effectRef idx="1">
+            <a:schemeClr val="dk1"/>
+          </a:effectRef>
+          <a:fontRef idx="minor">
+            <a:schemeClr val="dk1"/>
+          </a:fontRef>
+        </p:style>
+        <p:txBody>
+          <a:bodyPr rtlCol="0" anchor="t"/>
+          <a:lstStyle/>
+          <a:p>
+            <a:r>
+              <a:rPr lang="en-SG" dirty="0" smtClean="0">
+                <a:solidFill>
+                  <a:schemeClr val="tx1"/>
+                </a:solidFill>
+              </a:rPr>
+              <a:t>Document</a:t>
+            </a:r>
+            <a:endParaRPr lang="en-SG" dirty="0">
+              <a:solidFill>
+                <a:schemeClr val="tx1"/>
+              </a:solidFill>
+            </a:endParaRPr>
+          </a:p>
+        </p:txBody>
+      </p:sp>
+      <p:sp>
+        <p:nvSpPr>
+          <p:cNvPr id="6" name="Rectangle 5"/>
+          <p:cNvSpPr/>
+          <p:nvPr/>
+        </p:nvSpPr>
+        <p:spPr>
+          <a:xfrm>
+            <a:off x="2413987" y="955824"/>
+            <a:ext cx="2520280" cy="3193256"/>
+          </a:xfrm>
+          <a:prstGeom prst="rect">
+            <a:avLst/>
+          </a:prstGeom>
+          <a:ln>
+            <a:headEnd type="none" w="med" len="med"/>
+            <a:tailEnd type="arrow" w="med" len="med"/>
+          </a:ln>
+        </p:spPr>
+        <p:style>
+          <a:lnRef idx="1">
+            <a:schemeClr val="accent1"/>
+          </a:lnRef>
+          <a:fillRef idx="2">
+            <a:schemeClr val="accent1"/>
+          </a:fillRef>
+          <a:effectRef idx="1">
+            <a:schemeClr val="accent1"/>
+          </a:effectRef>
+          <a:fontRef idx="minor">
+            <a:schemeClr val="dk1"/>
+          </a:fontRef>
+        </p:style>
+        <p:txBody>
+          <a:bodyPr rtlCol="0" anchor="t"/>
+          <a:lstStyle/>
+          <a:p>
+            <a:r>
+              <a:rPr lang="en-SG" dirty="0" smtClean="0"/>
+              <a:t>Text</a:t>
+            </a:r>
+            <a:endParaRPr lang="en-SG" dirty="0"/>
+          </a:p>
+        </p:txBody>
+      </p:sp>
+      <p:sp>
+        <p:nvSpPr>
+          <p:cNvPr id="7" name="Rectangle 6"/>
+          <p:cNvSpPr/>
+          <p:nvPr/>
+        </p:nvSpPr>
+        <p:spPr>
+          <a:xfrm>
+            <a:off x="2195736" y="1700808"/>
+            <a:ext cx="2160240" cy="1224136"/>
+          </a:xfrm>
+          <a:prstGeom prst="rect">
+            <a:avLst/>
+          </a:prstGeom>
+          <a:solidFill>
+            <a:schemeClr val="bg1"/>
+          </a:solidFill>
+          <a:ln>
+            <a:headEnd type="none" w="med" len="med"/>
+            <a:tailEnd type="arrow" w="med" len="med"/>
+          </a:ln>
+        </p:spPr>
+        <p:style>
+          <a:lnRef idx="1">
+            <a:schemeClr val="dk1"/>
+          </a:lnRef>
+          <a:fillRef idx="2">
+            <a:schemeClr val="dk1"/>
+          </a:fillRef>
+          <a:effectRef idx="1">
+            <a:schemeClr val="dk1"/>
+          </a:effectRef>
+          <a:fontRef idx="minor">
+            <a:schemeClr val="dk1"/>
+          </a:fontRef>
+        </p:style>
+        <p:txBody>
+          <a:bodyPr rtlCol="0" anchor="t"/>
+          <a:lstStyle/>
+          <a:p>
+            <a:r>
+              <a:rPr lang="en-SG" dirty="0" smtClean="0"/>
+              <a:t>Screen</a:t>
+            </a:r>
+            <a:endParaRPr lang="en-SG" dirty="0"/>
+          </a:p>
+        </p:txBody>
+      </p:sp>
+      <p:sp>
+        <p:nvSpPr>
+          <p:cNvPr id="8" name="TextBox 7"/>
+          <p:cNvSpPr txBox="1"/>
+          <p:nvPr/>
+        </p:nvSpPr>
+        <p:spPr>
+          <a:xfrm>
+            <a:off x="1907704" y="980728"/>
+            <a:ext cx="451870" cy="3231654"/>
+          </a:xfrm>
+          <a:prstGeom prst="rect">
+            <a:avLst/>
+          </a:prstGeom>
+          <a:noFill/>
+        </p:spPr>
+        <p:txBody>
+          <a:bodyPr wrap="square" rtlCol="0">
+            <a:spAutoFit/>
+          </a:bodyPr>
+          <a:lstStyle/>
+          <a:p>
+            <a:pPr algn="r"/>
+            <a:r>
+              <a:rPr lang="en-SG" sz="1200" dirty="0" smtClean="0"/>
+              <a:t>0</a:t>
+            </a:r>
+          </a:p>
+          <a:p>
+            <a:pPr algn="r"/>
+            <a:r>
+              <a:rPr lang="en-SG" sz="1200" dirty="0" smtClean="0"/>
+              <a:t>13</a:t>
+            </a:r>
+          </a:p>
+          <a:p>
+            <a:pPr algn="r"/>
+            <a:r>
+              <a:rPr lang="en-SG" sz="1200" dirty="0" smtClean="0"/>
+              <a:t>34</a:t>
+            </a:r>
+          </a:p>
+          <a:p>
+            <a:pPr algn="r"/>
+            <a:r>
+              <a:rPr lang="en-SG" sz="1200" dirty="0" smtClean="0"/>
+              <a:t>45</a:t>
+            </a:r>
+          </a:p>
+          <a:p>
+            <a:pPr algn="r"/>
+            <a:r>
+              <a:rPr lang="en-SG" sz="1200" dirty="0" smtClean="0"/>
+              <a:t>56</a:t>
+            </a:r>
+          </a:p>
+          <a:p>
+            <a:pPr algn="r"/>
+            <a:r>
+              <a:rPr lang="en-SG" sz="1200" dirty="0" smtClean="0"/>
+              <a:t>85</a:t>
+            </a:r>
+          </a:p>
+          <a:p>
+            <a:pPr algn="r"/>
+            <a:r>
+              <a:rPr lang="en-SG" sz="1200" dirty="0" smtClean="0"/>
+              <a:t>93</a:t>
+            </a:r>
+          </a:p>
+          <a:p>
+            <a:pPr algn="r"/>
+            <a:r>
+              <a:rPr lang="en-SG" sz="1200" dirty="0" smtClean="0"/>
+              <a:t>113</a:t>
+            </a:r>
+          </a:p>
+          <a:p>
+            <a:pPr algn="r"/>
+            <a:r>
+              <a:rPr lang="en-SG" sz="1200" dirty="0" smtClean="0"/>
+              <a:t>127</a:t>
+            </a:r>
+          </a:p>
+          <a:p>
+            <a:pPr algn="r"/>
+            <a:r>
+              <a:rPr lang="en-SG" sz="1200" dirty="0" smtClean="0"/>
+              <a:t>139</a:t>
+            </a:r>
+          </a:p>
+          <a:p>
+            <a:pPr algn="r"/>
+            <a:r>
+              <a:rPr lang="en-SG" sz="1200" dirty="0" smtClean="0"/>
+              <a:t>147</a:t>
+            </a:r>
+          </a:p>
+          <a:p>
+            <a:pPr algn="r"/>
+            <a:r>
+              <a:rPr lang="en-SG" sz="1200" dirty="0" smtClean="0"/>
+              <a:t>156</a:t>
+            </a:r>
+          </a:p>
+          <a:p>
+            <a:pPr algn="r"/>
+            <a:r>
+              <a:rPr lang="en-SG" sz="1200" dirty="0" smtClean="0"/>
+              <a:t>163</a:t>
+            </a:r>
+          </a:p>
+          <a:p>
+            <a:pPr algn="r"/>
+            <a:r>
+              <a:rPr lang="en-SG" sz="1200" dirty="0" smtClean="0"/>
+              <a:t>176</a:t>
+            </a:r>
+          </a:p>
+          <a:p>
+            <a:pPr algn="r"/>
+            <a:r>
+              <a:rPr lang="en-SG" sz="1200" dirty="0" smtClean="0"/>
+              <a:t>189</a:t>
+            </a:r>
+          </a:p>
+          <a:p>
+            <a:pPr algn="r"/>
+            <a:r>
+              <a:rPr lang="en-SG" sz="1200" dirty="0" smtClean="0"/>
+              <a:t>199</a:t>
+            </a:r>
+          </a:p>
+          <a:p>
+            <a:pPr algn="r"/>
+            <a:r>
+              <a:rPr lang="en-SG" sz="1200" dirty="0" smtClean="0"/>
+              <a:t>214</a:t>
+            </a:r>
+            <a:endParaRPr lang="en-SG" sz="1200" dirty="0"/>
+          </a:p>
+        </p:txBody>
+      </p:sp>
+      <p:cxnSp>
+        <p:nvCxnSpPr>
+          <p:cNvPr id="10" name="Straight Arrow Connector 9"/>
+          <p:cNvCxnSpPr/>
+          <p:nvPr/>
+        </p:nvCxnSpPr>
+        <p:spPr>
+          <a:xfrm>
+            <a:off x="1567486" y="188640"/>
+            <a:ext cx="3816424" cy="0"/>
+          </a:xfrm>
+          <a:prstGeom prst="straightConnector1">
+            <a:avLst/>
+          </a:prstGeom>
+          <a:ln w="12700">
+            <a:solidFill>
+              <a:srgbClr val="385D8A"/>
+            </a:solidFill>
+            <a:tailEnd type="arrow"/>
+          </a:ln>
+        </p:spPr>
+        <p:style>
+          <a:lnRef idx="1">
+            <a:schemeClr val="accent1"/>
+          </a:lnRef>
+          <a:fillRef idx="0">
+            <a:schemeClr val="accent1"/>
+          </a:fillRef>
+          <a:effectRef idx="0">
+            <a:schemeClr val="accent1"/>
+          </a:effectRef>
+          <a:fontRef idx="minor">
+            <a:schemeClr val="tx1"/>
+          </a:fontRef>
+        </p:style>
+      </p:cxnSp>
+      <p:sp>
+        <p:nvSpPr>
+          <p:cNvPr id="11" name="TextBox 10"/>
+          <p:cNvSpPr txBox="1"/>
+          <p:nvPr/>
+        </p:nvSpPr>
+        <p:spPr>
+          <a:xfrm>
+            <a:off x="5311902" y="44624"/>
+            <a:ext cx="277640" cy="307777"/>
+          </a:xfrm>
+          <a:prstGeom prst="rect">
+            <a:avLst/>
+          </a:prstGeom>
+          <a:noFill/>
+        </p:spPr>
+        <p:txBody>
+          <a:bodyPr wrap="none" rtlCol="0">
+            <a:spAutoFit/>
+          </a:bodyPr>
+          <a:lstStyle/>
+          <a:p>
+            <a:r>
+              <a:rPr lang="en-SG" sz="1400" dirty="0" smtClean="0"/>
+              <a:t>X</a:t>
+            </a:r>
+            <a:endParaRPr lang="en-SG" sz="1400" dirty="0"/>
+          </a:p>
+        </p:txBody>
+      </p:sp>
+      <p:cxnSp>
+        <p:nvCxnSpPr>
+          <p:cNvPr id="13" name="Straight Arrow Connector 12"/>
+          <p:cNvCxnSpPr/>
+          <p:nvPr/>
+        </p:nvCxnSpPr>
+        <p:spPr>
+          <a:xfrm flipH="1">
+            <a:off x="1495478" y="188640"/>
+            <a:ext cx="72008" cy="4680520"/>
+          </a:xfrm>
+          <a:prstGeom prst="straightConnector1">
+            <a:avLst/>
+          </a:prstGeom>
+          <a:ln w="12700">
+            <a:solidFill>
+              <a:srgbClr val="385D8A"/>
+            </a:solidFill>
+            <a:tailEnd type="arrow"/>
+          </a:ln>
+        </p:spPr>
+        <p:style>
+          <a:lnRef idx="1">
+            <a:schemeClr val="accent1"/>
+          </a:lnRef>
+          <a:fillRef idx="0">
+            <a:schemeClr val="accent1"/>
+          </a:fillRef>
+          <a:effectRef idx="0">
+            <a:schemeClr val="accent1"/>
+          </a:effectRef>
+          <a:fontRef idx="minor">
+            <a:schemeClr val="tx1"/>
+          </a:fontRef>
+        </p:style>
+      </p:cxnSp>
+      <p:sp>
+        <p:nvSpPr>
+          <p:cNvPr id="14" name="TextBox 13"/>
+          <p:cNvSpPr txBox="1"/>
+          <p:nvPr/>
+        </p:nvSpPr>
+        <p:spPr>
+          <a:xfrm>
+            <a:off x="1359062" y="4882728"/>
+            <a:ext cx="272832" cy="307777"/>
+          </a:xfrm>
+          <a:prstGeom prst="rect">
+            <a:avLst/>
+          </a:prstGeom>
+          <a:noFill/>
+        </p:spPr>
+        <p:txBody>
+          <a:bodyPr wrap="none" rtlCol="0">
+            <a:spAutoFit/>
+          </a:bodyPr>
+          <a:lstStyle/>
+          <a:p>
+            <a:r>
+              <a:rPr lang="en-SG" sz="1400" dirty="0" smtClean="0"/>
+              <a:t>Y</a:t>
+            </a:r>
+            <a:endParaRPr lang="en-SG" sz="1400" dirty="0"/>
+          </a:p>
+        </p:txBody>
+      </p:sp>
+      <p:sp>
+        <p:nvSpPr>
+          <p:cNvPr id="15" name="TextBox 14"/>
+          <p:cNvSpPr txBox="1"/>
+          <p:nvPr/>
+        </p:nvSpPr>
+        <p:spPr>
+          <a:xfrm>
+            <a:off x="3131840" y="1124744"/>
+            <a:ext cx="1792414" cy="307777"/>
+          </a:xfrm>
+          <a:prstGeom prst="rect">
+            <a:avLst/>
+          </a:prstGeom>
+          <a:noFill/>
+        </p:spPr>
+        <p:txBody>
+          <a:bodyPr wrap="none" rtlCol="0">
+            <a:spAutoFit/>
+          </a:bodyPr>
+          <a:lstStyle/>
+          <a:p>
+            <a:r>
+              <a:rPr lang="en-SG" sz="1400" dirty="0" err="1" smtClean="0"/>
+              <a:t>VerticalScrollbar.Value</a:t>
+            </a:r>
+            <a:endParaRPr lang="en-SG" sz="1400" dirty="0"/>
+          </a:p>
+        </p:txBody>
+      </p:sp>
+      <p:sp>
+        <p:nvSpPr>
+          <p:cNvPr id="17" name="TextBox 16"/>
+          <p:cNvSpPr txBox="1"/>
+          <p:nvPr/>
+        </p:nvSpPr>
+        <p:spPr>
+          <a:xfrm>
+            <a:off x="651204" y="5445224"/>
+            <a:ext cx="7813614" cy="1107996"/>
+          </a:xfrm>
+          <a:prstGeom prst="rect">
+            <a:avLst/>
+          </a:prstGeom>
+          <a:noFill/>
+        </p:spPr>
+        <p:txBody>
+          <a:bodyPr wrap="square" rtlCol="0">
+            <a:spAutoFit/>
+          </a:bodyPr>
+          <a:lstStyle/>
+          <a:p>
+            <a:pPr>
+              <a:spcAft>
+                <a:spcPts val="600"/>
+              </a:spcAft>
+            </a:pPr>
+            <a:r>
+              <a:rPr lang="en-SG" sz="1400" b="1" dirty="0" smtClean="0"/>
+              <a:t>Document</a:t>
+            </a:r>
+            <a:r>
+              <a:rPr lang="en-SG" sz="1400" dirty="0" smtClean="0"/>
+              <a:t>: Covers  all characters of </a:t>
+            </a:r>
+            <a:r>
+              <a:rPr lang="en-SG" sz="1400" dirty="0" err="1" smtClean="0"/>
+              <a:t>AdrLabels</a:t>
+            </a:r>
+            <a:r>
+              <a:rPr lang="en-SG" sz="1400" dirty="0" smtClean="0"/>
+              <a:t> and pdf content, just used as coordinates, not stored, uses line number for y coordinates and pixels for x coordinates.</a:t>
+            </a:r>
+          </a:p>
+          <a:p>
+            <a:pPr>
+              <a:spcAft>
+                <a:spcPts val="600"/>
+              </a:spcAft>
+            </a:pPr>
+            <a:r>
+              <a:rPr lang="en-SG" sz="1400" b="1" dirty="0" smtClean="0"/>
+              <a:t>Text:</a:t>
+            </a:r>
+            <a:r>
+              <a:rPr lang="en-SG" sz="1400" dirty="0" smtClean="0"/>
+              <a:t> Contains all characters (incl. formatting chars) of pdf text. Uses char number for x line number for y.</a:t>
+            </a:r>
+          </a:p>
+          <a:p>
+            <a:pPr>
+              <a:spcAft>
+                <a:spcPts val="600"/>
+              </a:spcAft>
+            </a:pPr>
+            <a:r>
+              <a:rPr lang="en-SG" sz="1400" b="1" dirty="0" smtClean="0"/>
+              <a:t>Screen</a:t>
+            </a:r>
+            <a:r>
+              <a:rPr lang="en-SG" sz="1400" dirty="0" smtClean="0"/>
+              <a:t>: </a:t>
+            </a:r>
+            <a:r>
+              <a:rPr lang="en-SG" sz="1400" dirty="0" err="1" smtClean="0"/>
+              <a:t>TextViewer</a:t>
+            </a:r>
+            <a:r>
+              <a:rPr lang="en-SG" sz="1400" dirty="0" smtClean="0"/>
+              <a:t> window, shows part of </a:t>
+            </a:r>
+            <a:r>
+              <a:rPr lang="en-SG" sz="1400" dirty="0" err="1"/>
+              <a:t>AdrLabels</a:t>
+            </a:r>
+            <a:r>
+              <a:rPr lang="en-SG" sz="1400" dirty="0"/>
+              <a:t> and pdf </a:t>
+            </a:r>
+            <a:r>
+              <a:rPr lang="en-SG" sz="1400" dirty="0" smtClean="0"/>
+              <a:t>content on screen, uses pixels for x and y.</a:t>
+            </a:r>
+            <a:endParaRPr lang="en-SG" sz="1400" dirty="0"/>
+          </a:p>
+        </p:txBody>
+      </p:sp>
+      <p:cxnSp>
+        <p:nvCxnSpPr>
+          <p:cNvPr id="21" name="Straight Arrow Connector 20"/>
+          <p:cNvCxnSpPr/>
+          <p:nvPr/>
+        </p:nvCxnSpPr>
+        <p:spPr>
+          <a:xfrm>
+            <a:off x="3203848" y="955824"/>
+            <a:ext cx="0" cy="735111"/>
+          </a:xfrm>
+          <a:prstGeom prst="straightConnector1">
+            <a:avLst/>
+          </a:prstGeom>
+          <a:ln w="12700">
+            <a:solidFill>
+              <a:srgbClr val="385D8A"/>
+            </a:solidFill>
+            <a:headEnd type="arrow"/>
+            <a:tailEnd type="arrow"/>
+          </a:ln>
+        </p:spPr>
+        <p:style>
+          <a:lnRef idx="1">
+            <a:schemeClr val="accent1"/>
+          </a:lnRef>
+          <a:fillRef idx="0">
+            <a:schemeClr val="accent1"/>
+          </a:fillRef>
+          <a:effectRef idx="0">
+            <a:schemeClr val="accent1"/>
+          </a:effectRef>
+          <a:fontRef idx="minor">
+            <a:schemeClr val="tx1"/>
+          </a:fontRef>
+        </p:style>
+      </p:cxnSp>
+      <p:cxnSp>
+        <p:nvCxnSpPr>
+          <p:cNvPr id="23" name="Straight Arrow Connector 22"/>
+          <p:cNvCxnSpPr/>
+          <p:nvPr/>
+        </p:nvCxnSpPr>
+        <p:spPr>
+          <a:xfrm>
+            <a:off x="1855518" y="2492896"/>
+            <a:ext cx="340218" cy="0"/>
+          </a:xfrm>
+          <a:prstGeom prst="straightConnector1">
+            <a:avLst/>
+          </a:prstGeom>
+          <a:ln w="12700">
+            <a:solidFill>
+              <a:srgbClr val="385D8A"/>
+            </a:solidFill>
+            <a:headEnd type="arrow"/>
+            <a:tailEnd type="arrow"/>
+          </a:ln>
+        </p:spPr>
+        <p:style>
+          <a:lnRef idx="1">
+            <a:schemeClr val="accent1"/>
+          </a:lnRef>
+          <a:fillRef idx="0">
+            <a:schemeClr val="accent1"/>
+          </a:fillRef>
+          <a:effectRef idx="0">
+            <a:schemeClr val="accent1"/>
+          </a:effectRef>
+          <a:fontRef idx="minor">
+            <a:schemeClr val="tx1"/>
+          </a:fontRef>
+        </p:style>
+      </p:cxnSp>
+      <p:sp>
+        <p:nvSpPr>
+          <p:cNvPr id="24" name="TextBox 23"/>
+          <p:cNvSpPr txBox="1"/>
+          <p:nvPr/>
+        </p:nvSpPr>
+        <p:spPr>
+          <a:xfrm>
+            <a:off x="2267744" y="2348880"/>
+            <a:ext cx="1993751" cy="307777"/>
+          </a:xfrm>
+          <a:prstGeom prst="rect">
+            <a:avLst/>
+          </a:prstGeom>
+          <a:noFill/>
+        </p:spPr>
+        <p:txBody>
+          <a:bodyPr wrap="none" rtlCol="0">
+            <a:spAutoFit/>
+          </a:bodyPr>
+          <a:lstStyle/>
+          <a:p>
+            <a:r>
+              <a:rPr lang="en-SG" sz="1400" dirty="0" err="1" smtClean="0"/>
+              <a:t>HorizontalScrollbar.Value</a:t>
+            </a:r>
+            <a:endParaRPr lang="en-SG" sz="1400" dirty="0"/>
+          </a:p>
+        </p:txBody>
+      </p:sp>
+      <p:sp>
+        <p:nvSpPr>
+          <p:cNvPr id="25" name="TextBox 24"/>
+          <p:cNvSpPr txBox="1"/>
+          <p:nvPr/>
+        </p:nvSpPr>
+        <p:spPr>
+          <a:xfrm>
+            <a:off x="1940827" y="4653136"/>
+            <a:ext cx="4830297" cy="307777"/>
+          </a:xfrm>
+          <a:prstGeom prst="rect">
+            <a:avLst/>
+          </a:prstGeom>
+          <a:noFill/>
+        </p:spPr>
+        <p:txBody>
+          <a:bodyPr wrap="none" rtlCol="0">
+            <a:spAutoFit/>
+          </a:bodyPr>
+          <a:lstStyle/>
+          <a:p>
+            <a:r>
+              <a:rPr lang="en-SG" sz="1400" dirty="0" err="1" smtClean="0"/>
+              <a:t>AdrLabel</a:t>
+            </a:r>
+            <a:r>
+              <a:rPr lang="en-SG" sz="1400" dirty="0" smtClean="0"/>
+              <a:t> (Byte offset of first line character from start of pdf file)</a:t>
+            </a:r>
+            <a:endParaRPr lang="en-SG" sz="1400" dirty="0"/>
+          </a:p>
+        </p:txBody>
+      </p:sp>
+      <p:cxnSp>
+        <p:nvCxnSpPr>
+          <p:cNvPr id="27" name="Straight Arrow Connector 26"/>
+          <p:cNvCxnSpPr>
+            <a:endCxn id="8" idx="2"/>
+          </p:cNvCxnSpPr>
+          <p:nvPr/>
+        </p:nvCxnSpPr>
+        <p:spPr>
+          <a:xfrm flipH="1" flipV="1">
+            <a:off x="2133639" y="4212382"/>
+            <a:ext cx="62097" cy="440754"/>
+          </a:xfrm>
+          <a:prstGeom prst="straightConnector1">
+            <a:avLst/>
+          </a:prstGeom>
+          <a:ln w="12700">
+            <a:solidFill>
+              <a:srgbClr val="385D8A"/>
+            </a:solidFill>
+            <a:tailEnd type="arrow"/>
+          </a:ln>
+        </p:spPr>
+        <p:style>
+          <a:lnRef idx="1">
+            <a:schemeClr val="accent1"/>
+          </a:lnRef>
+          <a:fillRef idx="0">
+            <a:schemeClr val="accent1"/>
+          </a:fillRef>
+          <a:effectRef idx="0">
+            <a:schemeClr val="accent1"/>
+          </a:effectRef>
+          <a:fontRef idx="minor">
+            <a:schemeClr val="tx1"/>
+          </a:fontRef>
+        </p:style>
+      </p:cxnSp>
+      <p:cxnSp>
+        <p:nvCxnSpPr>
+          <p:cNvPr id="31" name="Straight Arrow Connector 30"/>
+          <p:cNvCxnSpPr/>
+          <p:nvPr/>
+        </p:nvCxnSpPr>
+        <p:spPr>
+          <a:xfrm>
+            <a:off x="1835696" y="4077072"/>
+            <a:ext cx="216024" cy="0"/>
+          </a:xfrm>
+          <a:prstGeom prst="straightConnector1">
+            <a:avLst/>
+          </a:prstGeom>
+          <a:ln w="12700">
+            <a:solidFill>
+              <a:srgbClr val="385D8A"/>
+            </a:solidFill>
+            <a:headEnd type="arrow"/>
+            <a:tailEnd type="arrow"/>
+          </a:ln>
+        </p:spPr>
+        <p:style>
+          <a:lnRef idx="1">
+            <a:schemeClr val="accent1"/>
+          </a:lnRef>
+          <a:fillRef idx="0">
+            <a:schemeClr val="accent1"/>
+          </a:fillRef>
+          <a:effectRef idx="0">
+            <a:schemeClr val="accent1"/>
+          </a:effectRef>
+          <a:fontRef idx="minor">
+            <a:schemeClr val="tx1"/>
+          </a:fontRef>
+        </p:style>
+      </p:cxnSp>
+      <p:sp>
+        <p:nvSpPr>
+          <p:cNvPr id="34" name="TextBox 33"/>
+          <p:cNvSpPr txBox="1"/>
+          <p:nvPr/>
+        </p:nvSpPr>
+        <p:spPr>
+          <a:xfrm>
+            <a:off x="1223734" y="3933056"/>
+            <a:ext cx="683970" cy="307777"/>
+          </a:xfrm>
+          <a:prstGeom prst="rect">
+            <a:avLst/>
+          </a:prstGeom>
+          <a:noFill/>
+        </p:spPr>
+        <p:txBody>
+          <a:bodyPr wrap="none" rtlCol="0">
+            <a:spAutoFit/>
+          </a:bodyPr>
+          <a:lstStyle/>
+          <a:p>
+            <a:r>
+              <a:rPr lang="en-SG" sz="1400" dirty="0" smtClean="0"/>
+              <a:t>Border</a:t>
+            </a:r>
+            <a:endParaRPr lang="en-SG" sz="1400" dirty="0"/>
+          </a:p>
+        </p:txBody>
+      </p:sp>
+    </p:spTree>
+    <p:extLst>
+      <p:ext uri="{BB962C8B-B14F-4D97-AF65-F5344CB8AC3E}">
+        <p14:creationId xmlns:p14="http://schemas.microsoft.com/office/powerpoint/2010/main" val="2379479454"/>
+      </p:ext>
+    </p:extLst>
+  </p:cSld>
+  <p:clrMapOvr>
+    <a:masterClrMapping/>
+  </p:clrMapOvr>
+  <p:timing>
+    <p:tnLst>
+      <p:par>
+        <p:cTn id="1" dur="indefinite" restart="never" nodeType="tmRoot"/>
+      </p:par>
+    </p:tnLst>
+  </p:timing>
 </p:sld>
 </file>
 
@@ -14855,22 +15720,13 @@
           <a:p>
             <a:r>
               <a:rPr lang="en-SG" sz="900" dirty="0" smtClean="0"/>
-              <a:t>    </a:t>
-            </a:r>
+              <a:t>                   %PDF-1.1</a:t>
+            </a:r>
+          </a:p>
+          <a:p>
             <a:r>
               <a:rPr lang="en-SG" sz="900" dirty="0" smtClean="0"/>
-              <a:t>               %PDF-1.1</a:t>
-            </a:r>
-            <a:endParaRPr lang="en-SG" sz="900" dirty="0" smtClean="0"/>
-          </a:p>
-          <a:p>
-            <a:r>
-              <a:rPr lang="en-SG" sz="900" dirty="0" smtClean="0"/>
-              <a:t>    </a:t>
-            </a:r>
-            <a:r>
-              <a:rPr lang="en-SG" sz="900" dirty="0" smtClean="0"/>
-              <a:t>               %</a:t>
+              <a:t>                   %</a:t>
             </a:r>
             <a:r>
               <a:rPr lang="en-SG" sz="900" dirty="0" err="1" smtClean="0"/>
@@ -14888,8 +15744,8 @@
         </p:nvSpPr>
         <p:spPr>
           <a:xfrm>
-            <a:off x="1835696" y="4941167"/>
-            <a:ext cx="1728192" cy="1800201"/>
+            <a:off x="1835695" y="4941167"/>
+            <a:ext cx="1930031" cy="1800201"/>
           </a:xfrm>
           <a:prstGeom prst="rect">
             <a:avLst/>
@@ -14930,8 +15786,8 @@
         </p:nvSpPr>
         <p:spPr>
           <a:xfrm>
-            <a:off x="1835696" y="495975"/>
-            <a:ext cx="1728192" cy="4373186"/>
+            <a:off x="1835695" y="495975"/>
+            <a:ext cx="1930031" cy="4373186"/>
           </a:xfrm>
           <a:prstGeom prst="rect">
             <a:avLst/>
@@ -14991,15 +15847,7 @@
             </a:r>
             <a:r>
               <a:rPr lang="en-US" sz="1100" b="1" dirty="0" smtClean="0"/>
-              <a:t> </a:t>
-            </a:r>
-            <a:r>
-              <a:rPr lang="en-US" sz="1100" b="1" dirty="0" smtClean="0"/>
-              <a:t>File </a:t>
-            </a:r>
-            <a:r>
-              <a:rPr lang="en-US" sz="1100" b="1" dirty="0" smtClean="0"/>
-              <a:t>Structure</a:t>
+              <a:t> File Structure</a:t>
             </a:r>
             <a:endParaRPr lang="en-SG" sz="1100" b="1" dirty="0"/>
           </a:p>
@@ -16900,11 +17748,6 @@
               </a:rPr>
               <a:t>5</a:t>
             </a:r>
-            <a:endParaRPr lang="en-SG" sz="900" dirty="0">
-              <a:solidFill>
-                <a:schemeClr val="bg1"/>
-              </a:solidFill>
-            </a:endParaRPr>
           </a:p>
         </p:txBody>
       </p:sp>
@@ -17478,6 +18321,89 @@
           </a:p>
         </p:txBody>
       </p:sp>
+      <p:sp>
+        <p:nvSpPr>
+          <p:cNvPr id="58" name="Freeform 57"/>
+          <p:cNvSpPr/>
+          <p:nvPr/>
+        </p:nvSpPr>
+        <p:spPr>
+          <a:xfrm>
+            <a:off x="3288723" y="5079423"/>
+            <a:ext cx="498684" cy="299604"/>
+          </a:xfrm>
+          <a:custGeom>
+            <a:avLst/>
+            <a:gdLst>
+              <a:gd name="connsiteX0" fmla="*/ 0 w 498684"/>
+              <a:gd name="connsiteY0" fmla="*/ 0 h 299604"/>
+              <a:gd name="connsiteX1" fmla="*/ 479713 w 498684"/>
+              <a:gd name="connsiteY1" fmla="*/ 157595 h 299604"/>
+              <a:gd name="connsiteX2" fmla="*/ 356754 w 498684"/>
+              <a:gd name="connsiteY2" fmla="*/ 299604 h 299604"/>
+            </a:gdLst>
+            <a:ahLst/>
+            <a:cxnLst>
+              <a:cxn ang="0">
+                <a:pos x="connsiteX0" y="connsiteY0"/>
+              </a:cxn>
+              <a:cxn ang="0">
+                <a:pos x="connsiteX1" y="connsiteY1"/>
+              </a:cxn>
+              <a:cxn ang="0">
+                <a:pos x="connsiteX2" y="connsiteY2"/>
+              </a:cxn>
+            </a:cxnLst>
+            <a:rect l="l" t="t" r="r" b="b"/>
+            <a:pathLst>
+              <a:path w="498684" h="299604">
+                <a:moveTo>
+                  <a:pt x="0" y="0"/>
+                </a:moveTo>
+                <a:cubicBezTo>
+                  <a:pt x="210127" y="53830"/>
+                  <a:pt x="420254" y="107661"/>
+                  <a:pt x="479713" y="157595"/>
+                </a:cubicBezTo>
+                <a:cubicBezTo>
+                  <a:pt x="539172" y="207529"/>
+                  <a:pt x="447963" y="253566"/>
+                  <a:pt x="356754" y="299604"/>
+                </a:cubicBezTo>
+              </a:path>
+            </a:pathLst>
+          </a:custGeom>
+          <a:noFill/>
+          <a:ln w="12700">
+            <a:headEnd type="none" w="med" len="med"/>
+            <a:tailEnd type="arrow" w="med" len="med"/>
+          </a:ln>
+        </p:spPr>
+        <p:style>
+          <a:lnRef idx="2">
+            <a:schemeClr val="accent1">
+              <a:shade val="50000"/>
+            </a:schemeClr>
+          </a:lnRef>
+          <a:fillRef idx="1">
+            <a:schemeClr val="accent1"/>
+          </a:fillRef>
+          <a:effectRef idx="0">
+            <a:schemeClr val="accent1"/>
+          </a:effectRef>
+          <a:fontRef idx="minor">
+            <a:schemeClr val="lt1"/>
+          </a:fontRef>
+        </p:style>
+        <p:txBody>
+          <a:bodyPr rtlCol="0" anchor="ctr"/>
+          <a:lstStyle/>
+          <a:p>
+            <a:pPr algn="ctr"/>
+            <a:endParaRPr lang="en-SG"/>
+          </a:p>
+        </p:txBody>
+      </p:sp>
     </p:spTree>
     <p:extLst>
       <p:ext uri="{BB962C8B-B14F-4D97-AF65-F5344CB8AC3E}">
@@ -17728,11 +18654,7 @@
             </a:r>
             <a:r>
               <a:rPr lang="en-SG" sz="1200" dirty="0" smtClean="0"/>
-              <a:t> </a:t>
-            </a:r>
-            <a:r>
-              <a:rPr lang="en-SG" sz="1200" dirty="0" smtClean="0"/>
-              <a:t>67964</a:t>
+              <a:t> 67964</a:t>
             </a:r>
           </a:p>
           <a:p>
@@ -17865,11 +18787,7 @@
           <a:p>
             <a:r>
               <a:rPr lang="pt-BR" sz="1200" dirty="0" smtClean="0"/>
-              <a:t>/</a:t>
-            </a:r>
-            <a:r>
-              <a:rPr lang="pt-BR" sz="1200" dirty="0" smtClean="0"/>
-              <a:t>ID [&lt;160c...&gt;</a:t>
+              <a:t>/ID [&lt;160c...&gt;</a:t>
             </a:r>
             <a:r>
               <a:rPr lang="pt-BR" sz="1200" dirty="0"/>
@@ -17941,11 +18859,7 @@
           <a:p>
             <a:r>
               <a:rPr lang="pt-BR" sz="1200" dirty="0" smtClean="0"/>
-              <a:t>/</a:t>
-            </a:r>
-            <a:r>
-              <a:rPr lang="pt-BR" sz="1200" dirty="0" smtClean="0"/>
-              <a:t>Type /Xref</a:t>
+              <a:t>/Type /Xref</a:t>
             </a:r>
           </a:p>
           <a:p>
@@ -18014,21 +18928,13 @@
           <a:p>
             <a:r>
               <a:rPr lang="pt-BR" sz="1200" dirty="0" smtClean="0"/>
-              <a:t>/</a:t>
-            </a:r>
+              <a:t>/Filter/FlateDecode</a:t>
+            </a:r>
+          </a:p>
+          <a:p>
             <a:r>
               <a:rPr lang="pt-BR" sz="1200" dirty="0" smtClean="0"/>
-              <a:t>Filter/FlateDecode</a:t>
-            </a:r>
-          </a:p>
-          <a:p>
-            <a:r>
-              <a:rPr lang="pt-BR" sz="1200" dirty="0" smtClean="0"/>
-              <a:t>/</a:t>
-            </a:r>
-            <a:r>
-              <a:rPr lang="pt-BR" sz="1200" dirty="0" smtClean="0"/>
-              <a:t>Length </a:t>
+              <a:t>/Length </a:t>
             </a:r>
             <a:r>
               <a:rPr lang="pt-BR" sz="1200" dirty="0"/>
@@ -18694,11 +19600,7 @@
             </a:r>
             <a:r>
               <a:rPr lang="en-SG" sz="1200" dirty="0" smtClean="0"/>
-              <a:t> </a:t>
-            </a:r>
-            <a:r>
-              <a:rPr lang="en-SG" sz="1200" dirty="0" smtClean="0"/>
-              <a:t>67964</a:t>
+              <a:t> 67964</a:t>
             </a:r>
           </a:p>
           <a:p>

</xml_diff>